<commit_message>
added reference to folders
</commit_message>
<xml_diff>
--- a/slides/6. Safe RL.pptx
+++ b/slides/6. Safe RL.pptx
@@ -5,7 +5,7 @@
     <p:sldMasterId id="2147483660" r:id="rId1"/>
   </p:sldMasterIdLst>
   <p:notesMasterIdLst>
-    <p:notesMasterId r:id="rId25"/>
+    <p:notesMasterId r:id="rId24"/>
   </p:notesMasterIdLst>
   <p:sldIdLst>
     <p:sldId id="256" r:id="rId2"/>
@@ -30,7 +30,6 @@
     <p:sldId id="511" r:id="rId21"/>
     <p:sldId id="506" r:id="rId22"/>
     <p:sldId id="258" r:id="rId23"/>
-    <p:sldId id="529" r:id="rId24"/>
   </p:sldIdLst>
   <p:sldSz cx="12192000" cy="6858000"/>
   <p:notesSz cx="6858000" cy="9144000"/>
@@ -16181,7 +16180,7 @@
           <a:p>
             <a:r>
               <a:rPr lang="en-US" dirty="0"/>
-              <a:t>Next Tasks</a:t>
+              <a:t>Next Tasks (papers are in the Zotero repo)</a:t>
             </a:r>
           </a:p>
         </p:txBody>
@@ -16205,16 +16204,149 @@
         <p:spPr>
           <a:xfrm>
             <a:off x="478369" y="1213308"/>
-            <a:ext cx="11473384" cy="3002360"/>
+            <a:ext cx="11473384" cy="5231176"/>
           </a:xfrm>
         </p:spPr>
         <p:txBody>
           <a:bodyPr/>
           <a:lstStyle/>
           <a:p>
-            <a:r>
-              <a:rPr lang="en-US" dirty="0"/>
-              <a:t>Choose one of the Safety-RL papers to read and write a gist (8 lines)</a:t>
+            <a:pPr marL="0" marR="0" lvl="0" indent="0" algn="l" defTabSz="914400" rtl="0" eaLnBrk="1" fontAlgn="auto" latinLnBrk="0" hangingPunct="1">
+              <a:lnSpc>
+                <a:spcPct val="100000"/>
+              </a:lnSpc>
+              <a:spcBef>
+                <a:spcPts val="0"/>
+              </a:spcBef>
+              <a:spcAft>
+                <a:spcPts val="0"/>
+              </a:spcAft>
+              <a:buClrTx/>
+              <a:buSzTx/>
+              <a:buFontTx/>
+              <a:buNone/>
+              <a:tabLst/>
+              <a:defRPr/>
+            </a:pPr>
+            <a:r>
+              <a:rPr lang="en-US" sz="1800" b="1" dirty="0">
+                <a:latin typeface="+mj-lt"/>
+              </a:rPr>
+              <a:t>1. Safety Challenges in AI and RL</a:t>
+            </a:r>
+          </a:p>
+          <a:p>
+            <a:pPr marL="0" marR="0" lvl="0" indent="0" algn="l" defTabSz="914400" rtl="0" eaLnBrk="1" fontAlgn="auto" latinLnBrk="0" hangingPunct="1">
+              <a:lnSpc>
+                <a:spcPct val="100000"/>
+              </a:lnSpc>
+              <a:spcBef>
+                <a:spcPts val="0"/>
+              </a:spcBef>
+              <a:spcAft>
+                <a:spcPts val="0"/>
+              </a:spcAft>
+              <a:buClrTx/>
+              <a:buSzTx/>
+              <a:buFontTx/>
+              <a:buNone/>
+              <a:tabLst/>
+              <a:defRPr/>
+            </a:pPr>
+            <a:r>
+              <a:rPr lang="en-US" sz="1800" dirty="0">
+                <a:effectLst/>
+                <a:latin typeface="+mj-lt"/>
+              </a:rPr>
+              <a:t>- </a:t>
+            </a:r>
+            <a:r>
+              <a:rPr lang="en-US" sz="1800" dirty="0" err="1">
+                <a:effectLst/>
+                <a:latin typeface="+mj-lt"/>
+              </a:rPr>
+              <a:t>Dulac</a:t>
+            </a:r>
+            <a:r>
+              <a:rPr lang="en-US" sz="1800" dirty="0">
+                <a:effectLst/>
+                <a:latin typeface="+mj-lt"/>
+              </a:rPr>
+              <a:t>-Arnold, Mankowitz, Hester, 2019, </a:t>
+            </a:r>
+            <a:r>
+              <a:rPr lang="en-US" sz="1800" dirty="0">
+                <a:latin typeface="+mj-lt"/>
+              </a:rPr>
+              <a:t>Challenges of Real-World Reinforcement Learning</a:t>
+            </a:r>
+            <a:endParaRPr lang="it-IT" sz="1800" dirty="0">
+              <a:latin typeface="+mj-lt"/>
+            </a:endParaRPr>
+          </a:p>
+          <a:p>
+            <a:pPr marL="0" marR="0" lvl="0" indent="0" algn="l" defTabSz="914400" rtl="0" eaLnBrk="1" fontAlgn="auto" latinLnBrk="0" hangingPunct="1">
+              <a:lnSpc>
+                <a:spcPct val="100000"/>
+              </a:lnSpc>
+              <a:spcBef>
+                <a:spcPts val="0"/>
+              </a:spcBef>
+              <a:spcAft>
+                <a:spcPts val="0"/>
+              </a:spcAft>
+              <a:buClrTx/>
+              <a:buSzTx/>
+              <a:buFontTx/>
+              <a:buNone/>
+              <a:tabLst/>
+              <a:defRPr/>
+            </a:pPr>
+            <a:r>
+              <a:rPr lang="it-IT" sz="1800" dirty="0">
+                <a:latin typeface="+mj-lt"/>
+              </a:rPr>
+              <a:t>- Amodei et al., 2016, Concrete </a:t>
+            </a:r>
+            <a:r>
+              <a:rPr lang="it-IT" sz="1800" dirty="0" err="1">
+                <a:latin typeface="+mj-lt"/>
+              </a:rPr>
+              <a:t>Problems</a:t>
+            </a:r>
+            <a:r>
+              <a:rPr lang="it-IT" sz="1800" dirty="0">
+                <a:latin typeface="+mj-lt"/>
+              </a:rPr>
+              <a:t> in AI </a:t>
+            </a:r>
+            <a:r>
+              <a:rPr lang="it-IT" sz="1800" dirty="0" err="1">
+                <a:latin typeface="+mj-lt"/>
+              </a:rPr>
+              <a:t>Safety</a:t>
+            </a:r>
+            <a:r>
+              <a:rPr lang="it-IT" sz="1800" dirty="0">
+                <a:latin typeface="+mj-lt"/>
+              </a:rPr>
+              <a:t> - https://arxiv.org/abs/1606.06565</a:t>
+            </a:r>
+            <a:endParaRPr lang="en-US" sz="1800" dirty="0">
+              <a:latin typeface="+mj-lt"/>
+            </a:endParaRPr>
+          </a:p>
+          <a:p>
+            <a:endParaRPr lang="en-US" dirty="0">
+              <a:latin typeface="+mj-lt"/>
+            </a:endParaRPr>
+          </a:p>
+          <a:p>
+            <a:r>
+              <a:rPr lang="en-US" b="1" dirty="0">
+                <a:latin typeface="+mj-lt"/>
+              </a:rPr>
+              <a:t>2. Choose one of the Safety-RL papers to read and write a gist (8 lines)</a:t>
             </a:r>
           </a:p>
           <a:p>
@@ -16223,15 +16355,21 @@
               <a:buChar char="•"/>
             </a:pPr>
             <a:r>
-              <a:rPr lang="en-US" dirty="0"/>
+              <a:rPr lang="en-US" dirty="0">
+                <a:latin typeface="+mj-lt"/>
+              </a:rPr>
               <a:t>Context (domain and how it might relate to </a:t>
             </a:r>
             <a:r>
-              <a:rPr lang="en-US" dirty="0" err="1"/>
+              <a:rPr lang="en-US" dirty="0" err="1">
+                <a:latin typeface="+mj-lt"/>
+              </a:rPr>
               <a:t>mRubis</a:t>
             </a:r>
             <a:r>
-              <a:rPr lang="en-US" dirty="0"/>
+              <a:rPr lang="en-US" dirty="0">
+                <a:latin typeface="+mj-lt"/>
+              </a:rPr>
               <a:t>) </a:t>
             </a:r>
           </a:p>
@@ -16241,7 +16379,9 @@
               <a:buChar char="•"/>
             </a:pPr>
             <a:r>
-              <a:rPr lang="en-US" dirty="0"/>
+              <a:rPr lang="en-US" dirty="0">
+                <a:latin typeface="+mj-lt"/>
+              </a:rPr>
               <a:t>Problem (what, why it matters, why is it challenging)</a:t>
             </a:r>
           </a:p>
@@ -16251,25 +16391,56 @@
               <a:buChar char="•"/>
             </a:pPr>
             <a:r>
-              <a:rPr lang="en-US" dirty="0"/>
+              <a:rPr lang="en-US" dirty="0">
+                <a:latin typeface="+mj-lt"/>
+              </a:rPr>
               <a:t>Approach (why is it a good idea/insight, how it works, how it compares with others)</a:t>
             </a:r>
           </a:p>
           <a:p>
+            <a:r>
+              <a:rPr lang="en-US" b="1" dirty="0">
+                <a:latin typeface="+mj-lt"/>
+              </a:rPr>
+              <a:t>3. Choose one of the Sim2Real papers and write a gist (8 lines)</a:t>
+            </a:r>
+          </a:p>
+          <a:p>
+            <a:endParaRPr lang="en-US" dirty="0">
+              <a:latin typeface="+mj-lt"/>
+            </a:endParaRPr>
+          </a:p>
+          <a:p>
+            <a:r>
+              <a:rPr lang="en-US" dirty="0">
+                <a:latin typeface="+mj-lt"/>
+              </a:rPr>
+              <a:t>For tasks 2 and 3, please check the following folders in Zotero:</a:t>
+            </a:r>
+          </a:p>
+          <a:p>
             <a:pPr marL="342900" indent="-342900">
-              <a:buFont typeface="Arial" panose="020B0604020202020204" pitchFamily="34" charset="0"/>
-              <a:buChar char="•"/>
+              <a:buFontTx/>
+              <a:buChar char="-"/>
             </a:pPr>
-            <a:endParaRPr lang="en-US" dirty="0"/>
-          </a:p>
-          <a:p>
-            <a:r>
-              <a:rPr lang="en-US" dirty="0"/>
-              <a:t>Choose on of the Sim2Real papers and write a gist (8 lines)</a:t>
-            </a:r>
-          </a:p>
-          <a:p>
-            <a:endParaRPr lang="en-US" dirty="0"/>
+            <a:r>
+              <a:rPr lang="en-US" dirty="0">
+                <a:latin typeface="+mj-lt"/>
+              </a:rPr>
+              <a:t>Safety (reinforcement learning)</a:t>
+            </a:r>
+          </a:p>
+          <a:p>
+            <a:pPr marL="342900" indent="-342900">
+              <a:buFontTx/>
+              <a:buChar char="-"/>
+            </a:pPr>
+            <a:r>
+              <a:rPr lang="en-US" dirty="0">
+                <a:latin typeface="+mj-lt"/>
+              </a:rPr>
+              <a:t>Sim2Real</a:t>
+            </a:r>
           </a:p>
         </p:txBody>
       </p:sp>
@@ -18346,272 +18517,6 @@
       <p:transition/>
     </mc:Fallback>
   </mc:AlternateContent>
-</p:sld>
-</file>
-
-<file path=ppt/slides/slide23.xml><?xml version="1.0" encoding="utf-8"?>
-<p:sld xmlns:a="http://schemas.openxmlformats.org/drawingml/2006/main" xmlns:r="http://schemas.openxmlformats.org/officeDocument/2006/relationships" xmlns:p="http://schemas.openxmlformats.org/presentationml/2006/main">
-  <p:cSld>
-    <p:spTree>
-      <p:nvGrpSpPr>
-        <p:cNvPr id="1" name=""/>
-        <p:cNvGrpSpPr/>
-        <p:nvPr/>
-      </p:nvGrpSpPr>
-      <p:grpSpPr>
-        <a:xfrm>
-          <a:off x="0" y="0"/>
-          <a:ext cx="0" cy="0"/>
-          <a:chOff x="0" y="0"/>
-          <a:chExt cx="0" cy="0"/>
-        </a:xfrm>
-      </p:grpSpPr>
-      <p:sp>
-        <p:nvSpPr>
-          <p:cNvPr id="2" name="Text Placeholder 1">
-            <a:extLst>
-              <a:ext uri="{FF2B5EF4-FFF2-40B4-BE49-F238E27FC236}">
-                <a16:creationId xmlns:a16="http://schemas.microsoft.com/office/drawing/2014/main" id="{6389F93E-E8EC-4EA3-B94D-5D9C8EE09183}"/>
-              </a:ext>
-            </a:extLst>
-          </p:cNvPr>
-          <p:cNvSpPr>
-            <a:spLocks noGrp="1"/>
-          </p:cNvSpPr>
-          <p:nvPr>
-            <p:ph type="body" sz="quarter" idx="13"/>
-          </p:nvPr>
-        </p:nvSpPr>
-        <p:spPr>
-          <a:xfrm>
-            <a:off x="478369" y="1225486"/>
-            <a:ext cx="11474451" cy="3034036"/>
-          </a:xfrm>
-        </p:spPr>
-        <p:txBody>
-          <a:bodyPr/>
-          <a:lstStyle/>
-          <a:p>
-            <a:pPr marL="0" marR="0" lvl="0" indent="0" algn="l" defTabSz="914400" rtl="0" eaLnBrk="1" fontAlgn="auto" latinLnBrk="0" hangingPunct="1">
-              <a:lnSpc>
-                <a:spcPct val="100000"/>
-              </a:lnSpc>
-              <a:spcBef>
-                <a:spcPts val="0"/>
-              </a:spcBef>
-              <a:spcAft>
-                <a:spcPts val="0"/>
-              </a:spcAft>
-              <a:buClrTx/>
-              <a:buSzTx/>
-              <a:buFontTx/>
-              <a:buNone/>
-              <a:tabLst/>
-              <a:defRPr/>
-            </a:pPr>
-            <a:r>
-              <a:rPr lang="en-US" sz="1900" b="1" dirty="0">
-                <a:latin typeface="+mj-lt"/>
-              </a:rPr>
-              <a:t>Read the papers</a:t>
-            </a:r>
-          </a:p>
-          <a:p>
-            <a:pPr marL="0" marR="0" lvl="0" indent="0" algn="l" defTabSz="914400" rtl="0" eaLnBrk="1" fontAlgn="auto" latinLnBrk="0" hangingPunct="1">
-              <a:lnSpc>
-                <a:spcPct val="100000"/>
-              </a:lnSpc>
-              <a:spcBef>
-                <a:spcPts val="0"/>
-              </a:spcBef>
-              <a:spcAft>
-                <a:spcPts val="0"/>
-              </a:spcAft>
-              <a:buClrTx/>
-              <a:buSzTx/>
-              <a:buFontTx/>
-              <a:buNone/>
-              <a:tabLst/>
-              <a:defRPr/>
-            </a:pPr>
-            <a:r>
-              <a:rPr lang="en-US" sz="1900" dirty="0">
-                <a:effectLst/>
-                <a:latin typeface="+mj-lt"/>
-              </a:rPr>
-              <a:t>- </a:t>
-            </a:r>
-            <a:r>
-              <a:rPr lang="en-US" sz="1900" dirty="0" err="1">
-                <a:effectLst/>
-                <a:latin typeface="+mj-lt"/>
-              </a:rPr>
-              <a:t>Dulac</a:t>
-            </a:r>
-            <a:r>
-              <a:rPr lang="en-US" sz="1900" dirty="0">
-                <a:effectLst/>
-                <a:latin typeface="+mj-lt"/>
-              </a:rPr>
-              <a:t>-Arnold, Mankowitz, Hester, 2019, </a:t>
-            </a:r>
-            <a:r>
-              <a:rPr lang="en-US" sz="1900" dirty="0">
-                <a:latin typeface="+mj-lt"/>
-              </a:rPr>
-              <a:t>Challenges of Real-World Reinforcement Learning</a:t>
-            </a:r>
-            <a:endParaRPr lang="it-IT" sz="1900" dirty="0">
-              <a:latin typeface="+mj-lt"/>
-            </a:endParaRPr>
-          </a:p>
-          <a:p>
-            <a:pPr marL="0" marR="0" lvl="0" indent="0" algn="l" defTabSz="914400" rtl="0" eaLnBrk="1" fontAlgn="auto" latinLnBrk="0" hangingPunct="1">
-              <a:lnSpc>
-                <a:spcPct val="100000"/>
-              </a:lnSpc>
-              <a:spcBef>
-                <a:spcPts val="0"/>
-              </a:spcBef>
-              <a:spcAft>
-                <a:spcPts val="0"/>
-              </a:spcAft>
-              <a:buClrTx/>
-              <a:buSzTx/>
-              <a:buFontTx/>
-              <a:buNone/>
-              <a:tabLst/>
-              <a:defRPr/>
-            </a:pPr>
-            <a:r>
-              <a:rPr lang="it-IT" sz="1900" dirty="0">
-                <a:latin typeface="+mj-lt"/>
-              </a:rPr>
-              <a:t>- Amodei et al., 2016, Concrete </a:t>
-            </a:r>
-            <a:r>
-              <a:rPr lang="it-IT" sz="1900" dirty="0" err="1">
-                <a:latin typeface="+mj-lt"/>
-              </a:rPr>
-              <a:t>Problems</a:t>
-            </a:r>
-            <a:r>
-              <a:rPr lang="it-IT" sz="1900" dirty="0">
-                <a:latin typeface="+mj-lt"/>
-              </a:rPr>
-              <a:t> in AI </a:t>
-            </a:r>
-            <a:r>
-              <a:rPr lang="it-IT" sz="1900" dirty="0" err="1">
-                <a:latin typeface="+mj-lt"/>
-              </a:rPr>
-              <a:t>Safety</a:t>
-            </a:r>
-            <a:r>
-              <a:rPr lang="it-IT" sz="1900" dirty="0">
-                <a:latin typeface="+mj-lt"/>
-              </a:rPr>
-              <a:t> - https://arxiv.org/abs/1606.06565</a:t>
-            </a:r>
-            <a:endParaRPr lang="en-US" sz="1900" dirty="0">
-              <a:latin typeface="+mj-lt"/>
-            </a:endParaRPr>
-          </a:p>
-          <a:p>
-            <a:endParaRPr lang="en-US" sz="1900" dirty="0">
-              <a:latin typeface="+mj-lt"/>
-            </a:endParaRPr>
-          </a:p>
-          <a:p>
-            <a:pPr marL="0" indent="0">
-              <a:buNone/>
-            </a:pPr>
-            <a:r>
-              <a:rPr lang="en-US" sz="1900" b="1" dirty="0">
-                <a:latin typeface="+mj-lt"/>
-              </a:rPr>
-              <a:t>Select a paper to read individually</a:t>
-            </a:r>
-          </a:p>
-          <a:p>
-            <a:pPr marL="0" indent="0">
-              <a:buNone/>
-            </a:pPr>
-            <a:r>
-              <a:rPr lang="en-US" sz="1900" dirty="0">
-                <a:latin typeface="+mj-lt"/>
-              </a:rPr>
-              <a:t>- One of the Safe RL </a:t>
-            </a:r>
-          </a:p>
-          <a:p>
-            <a:pPr marL="0" indent="0">
-              <a:buNone/>
-            </a:pPr>
-            <a:r>
-              <a:rPr lang="en-US" sz="1900" dirty="0">
-                <a:latin typeface="+mj-lt"/>
-              </a:rPr>
-              <a:t>- Or others from </a:t>
-            </a:r>
-            <a:r>
-              <a:rPr lang="en-US" sz="1900">
-                <a:latin typeface="+mj-lt"/>
-              </a:rPr>
-              <a:t>a list Chris will provide</a:t>
-            </a:r>
-            <a:endParaRPr lang="en-US" sz="1900" dirty="0">
-              <a:latin typeface="+mj-lt"/>
-            </a:endParaRPr>
-          </a:p>
-          <a:p>
-            <a:endParaRPr lang="en-US" sz="1900" dirty="0">
-              <a:latin typeface="+mj-lt"/>
-            </a:endParaRPr>
-          </a:p>
-        </p:txBody>
-      </p:sp>
-      <p:sp>
-        <p:nvSpPr>
-          <p:cNvPr id="3" name="Title 2">
-            <a:extLst>
-              <a:ext uri="{FF2B5EF4-FFF2-40B4-BE49-F238E27FC236}">
-                <a16:creationId xmlns:a16="http://schemas.microsoft.com/office/drawing/2014/main" id="{1A05762B-6BAA-4DA6-9A25-DE6FD5A219B6}"/>
-              </a:ext>
-            </a:extLst>
-          </p:cNvPr>
-          <p:cNvSpPr>
-            <a:spLocks noGrp="1"/>
-          </p:cNvSpPr>
-          <p:nvPr>
-            <p:ph type="title"/>
-          </p:nvPr>
-        </p:nvSpPr>
-        <p:spPr/>
-        <p:txBody>
-          <a:bodyPr/>
-          <a:lstStyle/>
-          <a:p>
-            <a:r>
-              <a:rPr lang="en-US" dirty="0"/>
-              <a:t>Tasks</a:t>
-            </a:r>
-          </a:p>
-        </p:txBody>
-      </p:sp>
-    </p:spTree>
-    <p:extLst>
-      <p:ext uri="{BB962C8B-B14F-4D97-AF65-F5344CB8AC3E}">
-        <p14:creationId xmlns:p14="http://schemas.microsoft.com/office/powerpoint/2010/main" val="2171664389"/>
-      </p:ext>
-    </p:extLst>
-  </p:cSld>
-  <p:clrMapOvr>
-    <a:masterClrMapping/>
-  </p:clrMapOvr>
-  <p:transition>
-    <p:fade/>
-  </p:transition>
 </p:sld>
 </file>
 

</xml_diff>